<commit_message>
Mise à jour des maquettes et de la soutenance
</commit_message>
<xml_diff>
--- a/Presentations/IF16 - Soutenance (2012-12-13).pptx
+++ b/Presentations/IF16 - Soutenance (2012-12-13).pptx
@@ -215,7 +215,7 @@
           <a:p>
             <a:fld id="{D61A2565-6D40-4B23-859E-D9BCB3692BB7}" type="datetimeFigureOut">
               <a:rPr lang="fr-FR" smtClean="0"/>
-              <a:t>10/12/2012</a:t>
+              <a:t>11/12/2012</a:t>
             </a:fld>
             <a:endParaRPr lang="fr-FR"/>
           </a:p>
@@ -381,7 +381,7 @@
           <a:p>
             <a:fld id="{6512828A-03C7-48BD-9576-CC18287F59C4}" type="datetimeFigureOut">
               <a:rPr lang="fr-FR" smtClean="0"/>
-              <a:t>10/12/2012</a:t>
+              <a:t>11/12/2012</a:t>
             </a:fld>
             <a:endParaRPr lang="fr-FR"/>
           </a:p>
@@ -854,7 +854,7 @@
           <a:p>
             <a:fld id="{28D617E9-4DC5-4EC6-98C6-0B64B6588A26}" type="datetime1">
               <a:rPr lang="fr-FR" smtClean="0"/>
-              <a:t>10/12/2012</a:t>
+              <a:t>11/12/2012</a:t>
             </a:fld>
             <a:endParaRPr lang="fr-FR"/>
           </a:p>
@@ -1217,7 +1217,7 @@
           <a:p>
             <a:fld id="{1EF804A6-386E-4EA4-A6B6-19A29D51B22F}" type="datetime1">
               <a:rPr lang="fr-FR" smtClean="0"/>
-              <a:t>10/12/2012</a:t>
+              <a:t>11/12/2012</a:t>
             </a:fld>
             <a:endParaRPr lang="fr-FR"/>
           </a:p>
@@ -1396,7 +1396,7 @@
           <a:p>
             <a:fld id="{9F510D14-2919-4415-9E6E-50288C4A0185}" type="datetime1">
               <a:rPr lang="fr-FR" smtClean="0"/>
-              <a:t>10/12/2012</a:t>
+              <a:t>11/12/2012</a:t>
             </a:fld>
             <a:endParaRPr lang="fr-FR"/>
           </a:p>
@@ -1635,7 +1635,7 @@
           <a:p>
             <a:fld id="{5B5D0BCA-E9F6-49CA-A266-F6B3862FD3D7}" type="datetime1">
               <a:rPr lang="fr-FR" smtClean="0"/>
-              <a:t>10/12/2012</a:t>
+              <a:t>11/12/2012</a:t>
             </a:fld>
             <a:endParaRPr lang="fr-FR"/>
           </a:p>
@@ -1903,7 +1903,7 @@
           <a:p>
             <a:fld id="{B5520773-D51C-4823-B4CC-093751D56B0B}" type="datetime1">
               <a:rPr lang="fr-FR" smtClean="0"/>
-              <a:t>10/12/2012</a:t>
+              <a:t>11/12/2012</a:t>
             </a:fld>
             <a:endParaRPr lang="fr-FR"/>
           </a:p>
@@ -2127,7 +2127,7 @@
           <a:p>
             <a:fld id="{760E2561-2F1F-489B-9C82-ED2BCDEF1B35}" type="datetime1">
               <a:rPr lang="fr-FR" smtClean="0"/>
-              <a:t>10/12/2012</a:t>
+              <a:t>11/12/2012</a:t>
             </a:fld>
             <a:endParaRPr lang="fr-FR"/>
           </a:p>
@@ -2483,7 +2483,7 @@
           <a:p>
             <a:fld id="{FF1A709E-936A-474A-AB8A-6EA9DEBE7546}" type="datetime1">
               <a:rPr lang="fr-FR" smtClean="0"/>
-              <a:t>10/12/2012</a:t>
+              <a:t>11/12/2012</a:t>
             </a:fld>
             <a:endParaRPr lang="fr-FR"/>
           </a:p>
@@ -2719,7 +2719,7 @@
           <a:p>
             <a:fld id="{7B908017-ADEF-4E54-B7C0-9B30DE52A226}" type="datetime1">
               <a:rPr lang="fr-FR" smtClean="0"/>
-              <a:t>10/12/2012</a:t>
+              <a:t>11/12/2012</a:t>
             </a:fld>
             <a:endParaRPr lang="fr-FR"/>
           </a:p>
@@ -2863,7 +2863,7 @@
           <a:p>
             <a:fld id="{367235AC-B55B-45CF-ADCB-00D8B13D5995}" type="datetime1">
               <a:rPr lang="fr-FR" smtClean="0"/>
-              <a:t>10/12/2012</a:t>
+              <a:t>11/12/2012</a:t>
             </a:fld>
             <a:endParaRPr lang="fr-FR"/>
           </a:p>
@@ -3144,7 +3144,7 @@
           <a:p>
             <a:fld id="{795BD412-05F1-4438-8B30-7893F6C9CE12}" type="datetime1">
               <a:rPr lang="fr-FR" smtClean="0"/>
-              <a:t>10/12/2012</a:t>
+              <a:t>11/12/2012</a:t>
             </a:fld>
             <a:endParaRPr lang="fr-FR"/>
           </a:p>
@@ -3550,7 +3550,7 @@
           <a:p>
             <a:fld id="{41750BCA-D5C2-4C66-88FD-6F3511557B99}" type="datetime1">
               <a:rPr lang="fr-FR" smtClean="0"/>
-              <a:t>10/12/2012</a:t>
+              <a:t>11/12/2012</a:t>
             </a:fld>
             <a:endParaRPr lang="fr-FR"/>
           </a:p>
@@ -3892,7 +3892,7 @@
           <a:p>
             <a:fld id="{CD43F58E-4C02-4BD8-8E8C-FEFDDC22BAD1}" type="datetime1">
               <a:rPr lang="fr-FR" smtClean="0"/>
-              <a:t>10/12/2012</a:t>
+              <a:t>11/12/2012</a:t>
             </a:fld>
             <a:endParaRPr lang="fr-FR"/>
           </a:p>
@@ -6924,7 +6924,7 @@
       </p:sp>
       <p:pic>
         <p:nvPicPr>
-          <p:cNvPr id="4098" name="Picture 2" descr="C:\Users\Jeremie\Documents\Etudes\2011 - Diplome Ingenieur Informatique (UTT)\Semestre 4\IF16 - Groupware et workflow - concepts et mise en oeuvre\Projet\Maquettes\Screenshots Balsamiq\VISITEUR+-+Accueil.png"/>
+          <p:cNvPr id="4098" name="Picture 2"/>
           <p:cNvPicPr>
             <a:picLocks noChangeAspect="1" noChangeArrowheads="1"/>
           </p:cNvPicPr>
@@ -6938,7 +6938,6 @@
               </a:ext>
             </a:extLst>
           </a:blip>
-          <a:srcRect/>
           <a:stretch>
             <a:fillRect/>
           </a:stretch>
@@ -6946,7 +6945,7 @@
         <p:spPr bwMode="auto">
           <a:xfrm>
             <a:off x="775538" y="763731"/>
-            <a:ext cx="7540878" cy="5655659"/>
+            <a:ext cx="7540878" cy="5655658"/>
           </a:xfrm>
           <a:prstGeom prst="rect">
             <a:avLst/>
@@ -7373,7 +7372,7 @@
         <p:spPr bwMode="auto">
           <a:xfrm>
             <a:off x="775538" y="763731"/>
-            <a:ext cx="7540878" cy="5655658"/>
+            <a:ext cx="7540877" cy="5655658"/>
           </a:xfrm>
           <a:prstGeom prst="rect">
             <a:avLst/>
@@ -7800,7 +7799,7 @@
         <p:spPr bwMode="auto">
           <a:xfrm>
             <a:off x="775538" y="763731"/>
-            <a:ext cx="7540877" cy="5655658"/>
+            <a:ext cx="7540877" cy="5655657"/>
           </a:xfrm>
           <a:prstGeom prst="rect">
             <a:avLst/>
@@ -8227,7 +8226,7 @@
         <p:spPr bwMode="auto">
           <a:xfrm>
             <a:off x="775538" y="763731"/>
-            <a:ext cx="7540877" cy="5655657"/>
+            <a:ext cx="7540876" cy="5655657"/>
           </a:xfrm>
           <a:prstGeom prst="rect">
             <a:avLst/>
@@ -15086,10 +15085,10 @@
                   </a:outerShdw>
                 </a:effectLst>
               </a:rPr>
-              <a:t>	Site </a:t>
-            </a:r>
-            <a:r>
-              <a:rPr lang="fr-FR" dirty="0" smtClean="0">
+              <a:t>	Site industriel			</a:t>
+            </a:r>
+            <a:r>
+              <a:rPr lang="fr-FR" sz="1600" i="1" dirty="0" smtClean="0">
                 <a:solidFill>
                   <a:schemeClr val="tx2"/>
                 </a:solidFill>
@@ -15101,52 +15100,7 @@
                   </a:outerShdw>
                 </a:effectLst>
               </a:rPr>
-              <a:t>industriel		</a:t>
-            </a:r>
-            <a:r>
-              <a:rPr lang="fr-FR" dirty="0" smtClean="0">
-                <a:solidFill>
-                  <a:schemeClr val="tx2"/>
-                </a:solidFill>
-                <a:effectLst>
-                  <a:outerShdw blurRad="38100" dist="38100" dir="2700000" algn="tl">
-                    <a:srgbClr val="000000">
-                      <a:alpha val="43137"/>
-                    </a:srgbClr>
-                  </a:outerShdw>
-                </a:effectLst>
-              </a:rPr>
-              <a:t>	</a:t>
-            </a:r>
-            <a:r>
-              <a:rPr lang="fr-FR" sz="1600" i="1" dirty="0" smtClean="0">
-                <a:solidFill>
-                  <a:schemeClr val="tx2"/>
-                </a:solidFill>
-                <a:effectLst>
-                  <a:outerShdw blurRad="38100" dist="38100" dir="2700000" algn="tl">
-                    <a:srgbClr val="000000">
-                      <a:alpha val="43137"/>
-                    </a:srgbClr>
-                  </a:outerShdw>
-                </a:effectLst>
-              </a:rPr>
-              <a:t>Exemple </a:t>
-            </a:r>
-            <a:r>
-              <a:rPr lang="fr-FR" sz="1600" i="1" dirty="0" smtClean="0">
-                <a:solidFill>
-                  <a:schemeClr val="tx2"/>
-                </a:solidFill>
-                <a:effectLst>
-                  <a:outerShdw blurRad="38100" dist="38100" dir="2700000" algn="tl">
-                    <a:srgbClr val="000000">
-                      <a:alpha val="43137"/>
-                    </a:srgbClr>
-                  </a:outerShdw>
-                </a:effectLst>
-              </a:rPr>
-              <a:t>: </a:t>
+              <a:t>Exemple : </a:t>
             </a:r>
             <a:r>
               <a:rPr lang="fr-FR" sz="1600" i="1" dirty="0" err="1" smtClean="0">
@@ -15193,10 +15147,10 @@
                   </a:outerShdw>
                 </a:effectLst>
               </a:rPr>
-              <a:t>	Site </a:t>
-            </a:r>
-            <a:r>
-              <a:rPr lang="fr-FR" dirty="0" smtClean="0">
+              <a:t>	Site non industriel 		</a:t>
+            </a:r>
+            <a:r>
+              <a:rPr lang="fr-FR" sz="1600" i="1" dirty="0" smtClean="0">
                 <a:solidFill>
                   <a:schemeClr val="tx2"/>
                 </a:solidFill>
@@ -15208,52 +15162,7 @@
                   </a:outerShdw>
                 </a:effectLst>
               </a:rPr>
-              <a:t>non industriel 	</a:t>
-            </a:r>
-            <a:r>
-              <a:rPr lang="fr-FR" dirty="0" smtClean="0">
-                <a:solidFill>
-                  <a:schemeClr val="tx2"/>
-                </a:solidFill>
-                <a:effectLst>
-                  <a:outerShdw blurRad="38100" dist="38100" dir="2700000" algn="tl">
-                    <a:srgbClr val="000000">
-                      <a:alpha val="43137"/>
-                    </a:srgbClr>
-                  </a:outerShdw>
-                </a:effectLst>
-              </a:rPr>
-              <a:t>	</a:t>
-            </a:r>
-            <a:r>
-              <a:rPr lang="fr-FR" sz="1600" i="1" dirty="0" smtClean="0">
-                <a:solidFill>
-                  <a:schemeClr val="tx2"/>
-                </a:solidFill>
-                <a:effectLst>
-                  <a:outerShdw blurRad="38100" dist="38100" dir="2700000" algn="tl">
-                    <a:srgbClr val="000000">
-                      <a:alpha val="43137"/>
-                    </a:srgbClr>
-                  </a:outerShdw>
-                </a:effectLst>
-              </a:rPr>
-              <a:t>Exemple </a:t>
-            </a:r>
-            <a:r>
-              <a:rPr lang="fr-FR" sz="1600" i="1" dirty="0" smtClean="0">
-                <a:solidFill>
-                  <a:schemeClr val="tx2"/>
-                </a:solidFill>
-                <a:effectLst>
-                  <a:outerShdw blurRad="38100" dist="38100" dir="2700000" algn="tl">
-                    <a:srgbClr val="000000">
-                      <a:alpha val="43137"/>
-                    </a:srgbClr>
-                  </a:outerShdw>
-                </a:effectLst>
-              </a:rPr>
-              <a:t>: UTT</a:t>
+              <a:t>Exemple : UTT</a:t>
             </a:r>
           </a:p>
           <a:p>
@@ -15270,31 +15179,7 @@
                   </a:outerShdw>
                 </a:effectLst>
               </a:rPr>
-              <a:t>	Produit </a:t>
-            </a:r>
-            <a:r>
-              <a:rPr lang="fr-FR" dirty="0" smtClean="0">
-                <a:effectLst>
-                  <a:outerShdw blurRad="38100" dist="38100" dir="2700000" algn="tl">
-                    <a:srgbClr val="000000">
-                      <a:alpha val="43137"/>
-                    </a:srgbClr>
-                  </a:outerShdw>
-                </a:effectLst>
-              </a:rPr>
-              <a:t>ou </a:t>
-            </a:r>
-            <a:r>
-              <a:rPr lang="fr-FR" dirty="0" smtClean="0">
-                <a:effectLst>
-                  <a:outerShdw blurRad="38100" dist="38100" dir="2700000" algn="tl">
-                    <a:srgbClr val="000000">
-                      <a:alpha val="43137"/>
-                    </a:srgbClr>
-                  </a:outerShdw>
-                </a:effectLst>
-              </a:rPr>
-              <a:t>service		</a:t>
+              <a:t>	Produit ou service		</a:t>
             </a:r>
             <a:r>
               <a:rPr lang="fr-FR" sz="1600" i="1" dirty="0" smtClean="0">
@@ -15358,19 +15243,7 @@
                   </a:outerShdw>
                 </a:effectLst>
               </a:rPr>
-              <a:t>	Risque</a:t>
-            </a:r>
-            <a:r>
-              <a:rPr lang="fr-FR" dirty="0" smtClean="0">
-                <a:effectLst>
-                  <a:outerShdw blurRad="38100" dist="38100" dir="2700000" algn="tl">
-                    <a:srgbClr val="000000">
-                      <a:alpha val="43137"/>
-                    </a:srgbClr>
-                  </a:outerShdw>
-                </a:effectLst>
-              </a:rPr>
-              <a:t>				</a:t>
+              <a:t>	Risque				</a:t>
             </a:r>
             <a:r>
               <a:rPr lang="fr-FR" sz="1600" i="1" dirty="0" smtClean="0">
@@ -15384,15 +15257,6 @@
               </a:rPr>
               <a:t>Exemple : Centrale nucléaire</a:t>
             </a:r>
-            <a:endParaRPr lang="fr-FR" sz="1600" i="1" dirty="0" smtClean="0">
-              <a:effectLst>
-                <a:outerShdw blurRad="38100" dist="38100" dir="2700000" algn="tl">
-                  <a:srgbClr val="000000">
-                    <a:alpha val="43137"/>
-                  </a:srgbClr>
-                </a:outerShdw>
-              </a:effectLst>
-            </a:endParaRPr>
           </a:p>
           <a:p>
             <a:pPr lvl="1"/>

</xml_diff>